<commit_message>
More updates to 5505 videos 4 and 5
</commit_message>
<xml_diff>
--- a/introduction-to-r/results/v05-slides-and-speaker-notes.pptx
+++ b/introduction-to-r/results/v05-slides-and-speaker-notes.pptx
@@ -5,7 +5,7 @@
     <p:sldMasterId id="2147483648" r:id="rId1"/>
   </p:sldMasterIdLst>
   <p:notesMasterIdLst>
-    <p:NotesMasterId r:id="rId36"/>
+    <p:NotesMasterId r:id="rId38"/>
   </p:notesMasterIdLst>
   <p:sldIdLst>
     <p:sldId id="256" r:id="rId2"/>
@@ -42,6 +42,8 @@
     <p:sldId id="287" r:id="rId33"/>
     <p:sldId id="288" r:id="rId34"/>
     <p:sldId id="289" r:id="rId35"/>
+    <p:sldId id="290" r:id="rId36"/>
+    <p:sldId id="291" r:id="rId37"/>
   </p:sldIdLst>
   <p:sldSz cx="12192000" cy="6858000"/>
   <p:notesSz cx="6858000" cy="9144000"/>
@@ -1859,6 +1861,132 @@
             </a:pPr>
             <a:r>
               <a:rPr/>
+              <a:t>Also</a:t>
+            </a:r>
+            <a:r>
+              <a:rPr/>
+              <a:t> </a:t>
+            </a:r>
+            <a:r>
+              <a:rPr/>
+              <a:t>recall</a:t>
+            </a:r>
+            <a:r>
+              <a:rPr/>
+              <a:t> </a:t>
+            </a:r>
+            <a:r>
+              <a:rPr/>
+              <a:t>that</a:t>
+            </a:r>
+            <a:r>
+              <a:rPr/>
+              <a:t> </a:t>
+            </a:r>
+            <a:r>
+              <a:rPr/>
+              <a:t>you</a:t>
+            </a:r>
+            <a:r>
+              <a:rPr/>
+              <a:t> </a:t>
+            </a:r>
+            <a:r>
+              <a:rPr/>
+              <a:t>use</a:t>
+            </a:r>
+            <a:r>
+              <a:rPr/>
+              <a:t> </a:t>
+            </a:r>
+            <a:r>
+              <a:rPr/>
+              <a:t>a</a:t>
+            </a:r>
+            <a:r>
+              <a:rPr/>
+              <a:t> </a:t>
+            </a:r>
+            <a:r>
+              <a:rPr/>
+              <a:t>crosstabulation</a:t>
+            </a:r>
+            <a:r>
+              <a:rPr/>
+              <a:t> </a:t>
+            </a:r>
+            <a:r>
+              <a:rPr/>
+              <a:t>to</a:t>
+            </a:r>
+            <a:r>
+              <a:rPr/>
+              <a:t> </a:t>
+            </a:r>
+            <a:r>
+              <a:rPr/>
+              <a:t>examine</a:t>
+            </a:r>
+            <a:r>
+              <a:rPr/>
+              <a:t> </a:t>
+            </a:r>
+            <a:r>
+              <a:rPr/>
+              <a:t>the</a:t>
+            </a:r>
+            <a:r>
+              <a:rPr/>
+              <a:t> </a:t>
+            </a:r>
+            <a:r>
+              <a:rPr/>
+              <a:t>relationship</a:t>
+            </a:r>
+            <a:r>
+              <a:rPr/>
+              <a:t> </a:t>
+            </a:r>
+            <a:r>
+              <a:rPr/>
+              <a:t>between</a:t>
+            </a:r>
+            <a:r>
+              <a:rPr/>
+              <a:t> </a:t>
+            </a:r>
+            <a:r>
+              <a:rPr/>
+              <a:t>two</a:t>
+            </a:r>
+            <a:r>
+              <a:rPr/>
+              <a:t> </a:t>
+            </a:r>
+            <a:r>
+              <a:rPr/>
+              <a:t>categorical</a:t>
+            </a:r>
+            <a:r>
+              <a:rPr/>
+              <a:t> </a:t>
+            </a:r>
+            <a:r>
+              <a:rPr/>
+              <a:t>variables.</a:t>
+            </a:r>
+          </a:p>
+          <a:p>
+            <a:pPr lvl="0" marL="0" indent="0">
+              <a:buNone/>
+            </a:pPr>
+          </a:p>
+          <a:p>
+            <a:pPr lvl="0" marL="0" indent="0">
+              <a:buNone/>
+            </a:pPr>
+            <a:r>
+              <a:rPr/>
               <a:t>The</a:t>
             </a:r>
             <a:r>
@@ -1923,7 +2051,7 @@
             </a:r>
             <a:r>
               <a:rPr/>
-              <a:t>51%</a:t>
+              <a:t>12%</a:t>
             </a:r>
             <a:r>
               <a:rPr/>
@@ -1939,7 +2067,7 @@
             </a:r>
             <a:r>
               <a:rPr/>
-              <a:t>NaN%.</a:t>
+              <a:t>8%.</a:t>
             </a:r>
           </a:p>
         </p:txBody>
@@ -5239,7 +5367,7 @@
           <a:p>
             <a:fld id="{18BDFEC3-8487-43E8-A154-7C12CBC1FFF2}" type="slidenum">
               <a:rPr lang="en-US"/>
-              <a:t>25</a:t>
+              <a:t>26</a:t>
             </a:fld>
             <a:endParaRPr lang="en-US"/>
           </a:p>
@@ -5657,7 +5785,7 @@
           <a:p>
             <a:fld id="{18BDFEC3-8487-43E8-A154-7C12CBC1FFF2}" type="slidenum">
               <a:rPr lang="en-US"/>
-              <a:t>26</a:t>
+              <a:t>27</a:t>
             </a:fld>
             <a:endParaRPr lang="en-US"/>
           </a:p>
@@ -5883,7 +6011,7 @@
           <a:p>
             <a:fld id="{18BDFEC3-8487-43E8-A154-7C12CBC1FFF2}" type="slidenum">
               <a:rPr lang="en-US"/>
-              <a:t>27</a:t>
+              <a:t>28</a:t>
             </a:fld>
             <a:endParaRPr lang="en-US"/>
           </a:p>
@@ -6243,7 +6371,7 @@
           <a:p>
             <a:fld id="{18BDFEC3-8487-43E8-A154-7C12CBC1FFF2}" type="slidenum">
               <a:rPr lang="en-US"/>
-              <a:t>28</a:t>
+              <a:t>30</a:t>
             </a:fld>
             <a:endParaRPr lang="en-US"/>
           </a:p>
@@ -6741,7 +6869,7 @@
           <a:p>
             <a:fld id="{18BDFEC3-8487-43E8-A154-7C12CBC1FFF2}" type="slidenum">
               <a:rPr lang="en-US"/>
-              <a:t>29</a:t>
+              <a:t>31</a:t>
             </a:fld>
             <a:endParaRPr lang="en-US"/>
           </a:p>
@@ -7785,7 +7913,7 @@
           <a:p>
             <a:fld id="{18BDFEC3-8487-43E8-A154-7C12CBC1FFF2}" type="slidenum">
               <a:rPr lang="en-US"/>
-              <a:t>30</a:t>
+              <a:t>32</a:t>
             </a:fld>
             <a:endParaRPr lang="en-US"/>
           </a:p>
@@ -8317,7 +8445,7 @@
           <a:p>
             <a:fld id="{18BDFEC3-8487-43E8-A154-7C12CBC1FFF2}" type="slidenum">
               <a:rPr lang="en-US"/>
-              <a:t>31</a:t>
+              <a:t>33</a:t>
             </a:fld>
             <a:endParaRPr lang="en-US"/>
           </a:p>
@@ -8583,7 +8711,7 @@
           <a:p>
             <a:fld id="{18BDFEC3-8487-43E8-A154-7C12CBC1FFF2}" type="slidenum">
               <a:rPr lang="en-US"/>
-              <a:t>32</a:t>
+              <a:t>34</a:t>
             </a:fld>
             <a:endParaRPr lang="en-US"/>
           </a:p>
@@ -8697,7 +8825,7 @@
           <a:p>
             <a:fld id="{18BDFEC3-8487-43E8-A154-7C12CBC1FFF2}" type="slidenum">
               <a:rPr lang="en-US"/>
-              <a:t>33</a:t>
+              <a:t>35</a:t>
             </a:fld>
             <a:endParaRPr lang="en-US"/>
           </a:p>
@@ -9211,7 +9339,7 @@
           <a:p>
             <a:fld id="{18BDFEC3-8487-43E8-A154-7C12CBC1FFF2}" type="slidenum">
               <a:rPr lang="en-US"/>
-              <a:t>34</a:t>
+              <a:t>36</a:t>
             </a:fld>
             <a:endParaRPr lang="en-US"/>
           </a:p>
@@ -14016,7 +14144,7 @@
               <a:rPr>
                 <a:latin typeface="Courier"/>
               </a:rPr>
-              <a:t>## [1] NA</a:t>
+              <a:t>## [1] 9.931193</a:t>
             </a:r>
           </a:p>
           <a:p>
@@ -14062,7 +14190,7 @@
               <a:rPr>
                 <a:latin typeface="Courier"/>
               </a:rPr>
-              <a:t>## [1] NA</a:t>
+              <a:t>## [1] 2.953935</a:t>
             </a:r>
           </a:p>
           <a:p>
@@ -14108,7 +14236,7 @@
               <a:rPr>
                 <a:latin typeface="Courier"/>
               </a:rPr>
-              <a:t>## [1] NA NA</a:t>
+              <a:t>## [1]  3 19</a:t>
             </a:r>
           </a:p>
         </p:txBody>
@@ -14249,7 +14377,7 @@
               <a:rPr>
                 <a:latin typeface="Courier"/>
               </a:rPr>
-              <a:t>## [1] 4.655963</a:t>
+              <a:t>## [1] 2.63678</a:t>
             </a:r>
           </a:p>
           <a:p>
@@ -14295,7 +14423,7 @@
               <a:rPr>
                 <a:latin typeface="Courier"/>
               </a:rPr>
-              <a:t>## [1] 3.223096</a:t>
+              <a:t>## [1] 0.8670591</a:t>
             </a:r>
           </a:p>
           <a:p>
@@ -14341,7 +14469,7 @@
               <a:rPr>
                 <a:latin typeface="Courier"/>
               </a:rPr>
-              <a:t>## [1] 0 9</a:t>
+              <a:t>## [1] 0.791 5.793</a:t>
             </a:r>
           </a:p>
         </p:txBody>
@@ -14482,7 +14610,7 @@
               <a:rPr>
                 <a:latin typeface="Courier"/>
               </a:rPr>
-              <a:t>## [1] 0</a:t>
+              <a:t>## [1] 61.14358</a:t>
             </a:r>
           </a:p>
           <a:p>
@@ -14528,7 +14656,7 @@
               <a:rPr>
                 <a:latin typeface="Courier"/>
               </a:rPr>
-              <a:t>## [1] 0</a:t>
+              <a:t>## [1] 5.703513</a:t>
             </a:r>
           </a:p>
           <a:p>
@@ -14574,7 +14702,7 @@
               <a:rPr>
                 <a:latin typeface="Courier"/>
               </a:rPr>
-              <a:t>## [1] 0 0</a:t>
+              <a:t>## [1] 46 74</a:t>
             </a:r>
           </a:p>
         </p:txBody>
@@ -14646,40 +14774,39 @@
             </a:pPr>
             <a:r>
               <a:rPr>
+                <a:latin typeface="Courier"/>
+              </a:rPr>
+              <a:t>plot1 </a:t>
+            </a:r>
+            <a:r>
+              <a:rPr>
+                <a:solidFill>
+                  <a:srgbClr val="007020"/>
+                </a:solidFill>
+                <a:latin typeface="Courier"/>
+              </a:rPr>
+              <a:t>&lt;-</a:t>
+            </a:r>
+            <a:r>
+              <a:rPr>
+                <a:latin typeface="Courier"/>
+              </a:rPr>
+              <a:t> </a:t>
+            </a:r>
+            <a:r>
+              <a:rPr>
                 <a:solidFill>
                   <a:srgbClr val="06287E"/>
                 </a:solidFill>
                 <a:latin typeface="Courier"/>
               </a:rPr>
-              <a:t>library</a:t>
-            </a:r>
-            <a:r>
-              <a:rPr>
-                <a:latin typeface="Courier"/>
-              </a:rPr>
-              <a:t>(ggplot2)</a:t>
-            </a:r>
-            <a:br/>
-            <a:r>
-              <a:rPr>
-                <a:latin typeface="Courier"/>
-              </a:rPr>
-              <a:t>plot1 </a:t>
-            </a:r>
-            <a:r>
-              <a:rPr>
-                <a:solidFill>
-                  <a:srgbClr val="007020"/>
-                </a:solidFill>
-                <a:latin typeface="Courier"/>
-              </a:rPr>
-              <a:t>&lt;-</a:t>
-            </a:r>
-            <a:r>
-              <a:rPr>
-                <a:latin typeface="Courier"/>
-              </a:rPr>
-              <a:t> </a:t>
+              <a:t>ggplot</a:t>
+            </a:r>
+            <a:r>
+              <a:rPr>
+                <a:latin typeface="Courier"/>
+              </a:rPr>
+              <a:t>(fev, </a:t>
             </a:r>
             <a:r>
               <a:rPr>
@@ -14688,13 +14815,59 @@
                 </a:solidFill>
                 <a:latin typeface="Courier"/>
               </a:rPr>
-              <a:t>ggplot</a:t>
-            </a:r>
-            <a:r>
-              <a:rPr>
-                <a:latin typeface="Courier"/>
-              </a:rPr>
-              <a:t>(fev, </a:t>
+              <a:t>aes</a:t>
+            </a:r>
+            <a:r>
+              <a:rPr>
+                <a:latin typeface="Courier"/>
+              </a:rPr>
+              <a:t>(</a:t>
+            </a:r>
+            <a:r>
+              <a:rPr>
+                <a:solidFill>
+                  <a:srgbClr val="7D9029"/>
+                </a:solidFill>
+                <a:latin typeface="Courier"/>
+              </a:rPr>
+              <a:t>x=</a:t>
+            </a:r>
+            <a:r>
+              <a:rPr>
+                <a:latin typeface="Courier"/>
+              </a:rPr>
+              <a:t>age, </a:t>
+            </a:r>
+            <a:r>
+              <a:rPr>
+                <a:solidFill>
+                  <a:srgbClr val="7D9029"/>
+                </a:solidFill>
+                <a:latin typeface="Courier"/>
+              </a:rPr>
+              <a:t>y=</a:t>
+            </a:r>
+            <a:r>
+              <a:rPr>
+                <a:latin typeface="Courier"/>
+              </a:rPr>
+              <a:t>fev)) </a:t>
+            </a:r>
+            <a:r>
+              <a:rPr>
+                <a:solidFill>
+                  <a:srgbClr val="4070A0"/>
+                </a:solidFill>
+                <a:latin typeface="Courier"/>
+              </a:rPr>
+              <a:t>+</a:t>
+            </a:r>
+            <a:br/>
+            <a:r>
+              <a:rPr>
+                <a:latin typeface="Courier"/>
+              </a:rPr>
+              <a:t>  </a:t>
             </a:r>
             <a:r>
               <a:rPr>
@@ -14703,7 +14876,23 @@
                 </a:solidFill>
                 <a:latin typeface="Courier"/>
               </a:rPr>
-              <a:t>aes</a:t>
+              <a:t>geom_point</a:t>
+            </a:r>
+            <a:r>
+              <a:rPr>
+                <a:latin typeface="Courier"/>
+              </a:rPr>
+              <a:t>()</a:t>
+            </a:r>
+            <a:br/>
+            <a:r>
+              <a:rPr>
+                <a:solidFill>
+                  <a:srgbClr val="06287E"/>
+                </a:solidFill>
+                <a:latin typeface="Courier"/>
+              </a:rPr>
+              <a:t>ggsave</a:t>
             </a:r>
             <a:r>
               <a:rPr>
@@ -14711,35 +14900,12 @@
               </a:rPr>
               <a:t>(</a:t>
             </a:r>
-            <a:r>
-              <a:rPr>
-                <a:solidFill>
-                  <a:srgbClr val="7D9029"/>
-                </a:solidFill>
-                <a:latin typeface="Courier"/>
-              </a:rPr>
-              <a:t>x=</a:t>
-            </a:r>
-            <a:r>
-              <a:rPr>
-                <a:latin typeface="Courier"/>
-              </a:rPr>
-              <a:t>age, </a:t>
-            </a:r>
-            <a:r>
-              <a:rPr>
-                <a:solidFill>
-                  <a:srgbClr val="7D9029"/>
-                </a:solidFill>
-                <a:latin typeface="Courier"/>
-              </a:rPr>
-              <a:t>y=</a:t>
-            </a:r>
-            <a:r>
-              <a:rPr>
-                <a:latin typeface="Courier"/>
-              </a:rPr>
-              <a:t>fev)) </a:t>
+            <a:br/>
+            <a:r>
+              <a:rPr>
+                <a:latin typeface="Courier"/>
+              </a:rPr>
+              <a:t>  </a:t>
             </a:r>
             <a:r>
               <a:rPr>
@@ -14748,108 +14914,20 @@
                 </a:solidFill>
                 <a:latin typeface="Courier"/>
               </a:rPr>
-              <a:t>+</a:t>
+              <a:t>"../images/age-by-fev.png"</a:t>
+            </a:r>
+            <a:r>
+              <a:rPr>
+                <a:latin typeface="Courier"/>
+              </a:rPr>
+              <a:t>, </a:t>
             </a:r>
             <a:br/>
             <a:r>
               <a:rPr>
                 <a:latin typeface="Courier"/>
               </a:rPr>
-              <a:t>  </a:t>
-            </a:r>
-            <a:r>
-              <a:rPr>
-                <a:solidFill>
-                  <a:srgbClr val="06287E"/>
-                </a:solidFill>
-                <a:latin typeface="Courier"/>
-              </a:rPr>
-              <a:t>geom_point</a:t>
-            </a:r>
-            <a:r>
-              <a:rPr>
-                <a:latin typeface="Courier"/>
-              </a:rPr>
-              <a:t>()</a:t>
-            </a:r>
-            <a:br/>
-            <a:r>
-              <a:rPr>
-                <a:solidFill>
-                  <a:srgbClr val="06287E"/>
-                </a:solidFill>
-                <a:latin typeface="Courier"/>
-              </a:rPr>
-              <a:t>ggsave</a:t>
-            </a:r>
-            <a:r>
-              <a:rPr>
-                <a:latin typeface="Courier"/>
-              </a:rPr>
-              <a:t>(</a:t>
-            </a:r>
-            <a:r>
-              <a:rPr>
-                <a:solidFill>
-                  <a:srgbClr val="4070A0"/>
-                </a:solidFill>
-                <a:latin typeface="Courier"/>
-              </a:rPr>
-              <a:t>"../images/age-by-fev.png"</a:t>
-            </a:r>
-            <a:r>
-              <a:rPr>
-                <a:latin typeface="Courier"/>
-              </a:rPr>
-              <a:t>, plot1, </a:t>
-            </a:r>
-            <a:r>
-              <a:rPr>
-                <a:solidFill>
-                  <a:srgbClr val="7D9029"/>
-                </a:solidFill>
-                <a:latin typeface="Courier"/>
-              </a:rPr>
-              <a:t>width=</a:t>
-            </a:r>
-            <a:r>
-              <a:rPr>
-                <a:solidFill>
-                  <a:srgbClr val="40A070"/>
-                </a:solidFill>
-                <a:latin typeface="Courier"/>
-              </a:rPr>
-              <a:t>4</a:t>
-            </a:r>
-            <a:r>
-              <a:rPr>
-                <a:latin typeface="Courier"/>
-              </a:rPr>
-              <a:t>, </a:t>
-            </a:r>
-            <a:r>
-              <a:rPr>
-                <a:solidFill>
-                  <a:srgbClr val="7D9029"/>
-                </a:solidFill>
-                <a:latin typeface="Courier"/>
-              </a:rPr>
-              <a:t>height=</a:t>
-            </a:r>
-            <a:r>
-              <a:rPr>
-                <a:solidFill>
-                  <a:srgbClr val="40A070"/>
-                </a:solidFill>
-                <a:latin typeface="Courier"/>
-              </a:rPr>
-              <a:t>4</a:t>
-            </a:r>
-            <a:r>
-              <a:rPr>
-                <a:latin typeface="Courier"/>
-              </a:rPr>
-              <a:t>)</a:t>
+              <a:t>  plot1)</a:t>
             </a:r>
           </a:p>
           <a:p>
@@ -14860,8 +14938,7 @@
               <a:rPr>
                 <a:latin typeface="Courier"/>
               </a:rPr>
-              <a:t>## Warning: Removed 309 rows containing missing
-## values (geom_point).</a:t>
+              <a:t>## Saving 5 x 4 in image</a:t>
             </a:r>
           </a:p>
         </p:txBody>
@@ -14929,8 +15006,8 @@
         </p:blipFill>
         <p:spPr bwMode="auto">
           <a:xfrm>
-            <a:off x="3835400" y="1600200"/>
-            <a:ext cx="4521200" cy="4521200"/>
+            <a:off x="3276600" y="1600200"/>
+            <a:ext cx="5651500" cy="4521200"/>
           </a:xfrm>
           <a:prstGeom prst="rect">
             <a:avLst/>
@@ -15532,7 +15609,7 @@
               </a:rPr>
               <a:t>## 
 ## nonsmoker    smoker      &lt;NA&gt; 
-##       318       336         0</a:t>
+##       589        65         0</a:t>
             </a:r>
           </a:p>
           <a:p>
@@ -15604,7 +15681,7 @@
               </a:rPr>
               <a:t>## 
 ## female   male   &lt;NA&gt; 
-##    424      0    230</a:t>
+##    318    336      0</a:t>
             </a:r>
           </a:p>
         </p:txBody>
@@ -15671,15 +15748,6 @@
           <a:bodyPr/>
           <a:lstStyle/>
           <a:p>
-            <a:pPr lvl="0" marL="0" indent="0">
-              <a:buNone/>
-            </a:pPr>
-            <a:r>
-              <a:rPr/>
-              <a:t>Also recall that you use a crosstabulation to examine the relationship between two categorical variables.</a:t>
-            </a:r>
-          </a:p>
-          <a:p>
             <a:pPr lvl="0" indent="0">
               <a:buNone/>
             </a:pPr>
@@ -15704,6 +15772,13 @@
               </a:rPr>
               <a:t> </a:t>
             </a:r>
+            <a:br/>
+            <a:r>
+              <a:rPr>
+                <a:latin typeface="Courier"/>
+              </a:rPr>
+              <a:t>  </a:t>
+            </a:r>
             <a:r>
               <a:rPr>
                 <a:solidFill>
@@ -15771,6 +15846,13 @@
               </a:rPr>
               <a:t> </a:t>
             </a:r>
+            <a:br/>
+            <a:r>
+              <a:rPr>
+                <a:latin typeface="Courier"/>
+              </a:rPr>
+              <a:t>  </a:t>
+            </a:r>
             <a:r>
               <a:rPr>
                 <a:solidFill>
@@ -15832,6 +15914,13 @@
               </a:rPr>
               <a:t> </a:t>
             </a:r>
+            <a:br/>
+            <a:r>
+              <a:rPr>
+                <a:latin typeface="Courier"/>
+              </a:rPr>
+              <a:t>  </a:t>
+            </a:r>
             <a:r>
               <a:rPr>
                 <a:solidFill>
@@ -15889,8 +15978,8 @@
               </a:rPr>
               <a:t>##         
 ##          nonsmoker smoker
-##   female        49     51
-##   male</a:t>
+##   female        88     12
+##   male          92      8</a:t>
             </a:r>
           </a:p>
         </p:txBody>
@@ -16087,6 +16176,13 @@
               </a:rPr>
               <a:t> </a:t>
             </a:r>
+            <a:br/>
+            <a:r>
+              <a:rPr>
+                <a:latin typeface="Courier"/>
+              </a:rPr>
+              <a:t>  </a:t>
+            </a:r>
             <a:r>
               <a:rPr>
                 <a:solidFill>
@@ -16161,7 +16257,7 @@
               <a:rPr>
                 <a:latin typeface="Courier"/>
               </a:rPr>
-              <a:t>  </a:t>
+              <a:t>    </a:t>
             </a:r>
             <a:r>
               <a:rPr>
@@ -16394,7 +16490,7 @@
               <a:rPr>
                 <a:latin typeface="Courier"/>
               </a:rPr>
-              <a:t>## [1] "2022-03-07"</a:t>
+              <a:t>## [1] "2022-03-08"</a:t>
             </a:r>
           </a:p>
         </p:txBody>
@@ -16648,6 +16744,13 @@
               </a:rPr>
               <a:t> </a:t>
             </a:r>
+            <a:br/>
+            <a:r>
+              <a:rPr>
+                <a:latin typeface="Courier"/>
+              </a:rPr>
+              <a:t>  </a:t>
+            </a:r>
             <a:r>
               <a:rPr>
                 <a:solidFill>
@@ -16692,7 +16795,7 @@
               <a:rPr>
                 <a:latin typeface="Courier"/>
               </a:rPr>
-              <a:t>  </a:t>
+              <a:t>    </a:t>
             </a:r>
             <a:r>
               <a:rPr>
@@ -16725,6 +16828,13 @@
               </a:rPr>
               <a:t>(</a:t>
             </a:r>
+            <a:br/>
+            <a:r>
+              <a:rPr>
+                <a:latin typeface="Courier"/>
+              </a:rPr>
+              <a:t>  </a:t>
+            </a:r>
             <a:r>
               <a:rPr>
                 <a:solidFill>
@@ -16738,55 +16848,14 @@
               <a:rPr>
                 <a:latin typeface="Courier"/>
               </a:rPr>
-              <a:t>, plot3, </a:t>
-            </a:r>
-            <a:r>
-              <a:rPr>
-                <a:solidFill>
-                  <a:srgbClr val="7D9029"/>
-                </a:solidFill>
-                <a:latin typeface="Courier"/>
-              </a:rPr>
-              <a:t>height=</a:t>
-            </a:r>
-            <a:r>
-              <a:rPr>
-                <a:solidFill>
-                  <a:srgbClr val="40A070"/>
-                </a:solidFill>
-                <a:latin typeface="Courier"/>
-              </a:rPr>
-              <a:t>4</a:t>
-            </a:r>
-            <a:r>
-              <a:rPr>
-                <a:latin typeface="Courier"/>
-              </a:rPr>
               <a:t>, </a:t>
             </a:r>
-            <a:r>
-              <a:rPr>
-                <a:solidFill>
-                  <a:srgbClr val="7D9029"/>
-                </a:solidFill>
-                <a:latin typeface="Courier"/>
-              </a:rPr>
-              <a:t>width=</a:t>
-            </a:r>
-            <a:r>
-              <a:rPr>
-                <a:solidFill>
-                  <a:srgbClr val="40A070"/>
-                </a:solidFill>
-                <a:latin typeface="Courier"/>
-              </a:rPr>
-              <a:t>4</a:t>
-            </a:r>
-            <a:r>
-              <a:rPr>
-                <a:latin typeface="Courier"/>
-              </a:rPr>
-              <a:t>)</a:t>
+            <a:br/>
+            <a:r>
+              <a:rPr>
+                <a:latin typeface="Courier"/>
+              </a:rPr>
+              <a:t>  plot3)</a:t>
             </a:r>
           </a:p>
           <a:p>
@@ -16797,8 +16866,7 @@
               <a:rPr>
                 <a:latin typeface="Courier"/>
               </a:rPr>
-              <a:t>## Warning: Removed 309 rows containing non-finite
-## values (stat_boxplot).</a:t>
+              <a:t>## Saving 5 x 4 in image</a:t>
             </a:r>
           </a:p>
         </p:txBody>
@@ -16866,8 +16934,8 @@
         </p:blipFill>
         <p:spPr bwMode="auto">
           <a:xfrm>
-            <a:off x="4089400" y="1600200"/>
-            <a:ext cx="4013200" cy="4013200"/>
+            <a:off x="3581400" y="1600200"/>
+            <a:ext cx="5016500" cy="4013200"/>
           </a:xfrm>
           <a:prstGeom prst="rect">
             <a:avLst/>
@@ -17237,10 +17305,10 @@
                 <a:latin typeface="Courier"/>
               </a:rPr>
               <a:t>## fev$smoke_factor: nonsmoker
-## [1] 4.716981
-## ------------------------------- 
+## [1] 2.566143
+## ------------------------------ 
 ## fev$smoke_factor: smoker
-## [1] 4.598214</a:t>
+## [1] 3.276862</a:t>
             </a:r>
           </a:p>
         </p:txBody>
@@ -17287,23 +17355,31 @@
             </a:pPr>
             <a:r>
               <a:rPr/>
-              <a:t>Group</a:t>
-            </a:r>
-            <a:r>
-              <a:rPr/>
-              <a:t> </a:t>
-            </a:r>
-            <a:r>
-              <a:rPr/>
-              <a:t>standard</a:t>
-            </a:r>
-            <a:r>
-              <a:rPr/>
-              <a:t> </a:t>
-            </a:r>
-            <a:r>
-              <a:rPr/>
-              <a:t>deviations</a:t>
+              <a:t>Don’t</a:t>
+            </a:r>
+            <a:r>
+              <a:rPr/>
+              <a:t> </a:t>
+            </a:r>
+            <a:r>
+              <a:rPr/>
+              <a:t>forget</a:t>
+            </a:r>
+            <a:r>
+              <a:rPr/>
+              <a:t> </a:t>
+            </a:r>
+            <a:r>
+              <a:rPr/>
+              <a:t>to</a:t>
+            </a:r>
+            <a:r>
+              <a:rPr/>
+              <a:t> </a:t>
+            </a:r>
+            <a:r>
+              <a:rPr/>
+              <a:t>round</a:t>
             </a:r>
           </a:p>
         </p:txBody>
@@ -17328,100 +17404,33 @@
             </a:pPr>
             <a:r>
               <a:rPr>
-                <a:latin typeface="Courier"/>
-              </a:rPr>
-              <a:t>fev_stdev </a:t>
-            </a:r>
-            <a:r>
-              <a:rPr>
-                <a:solidFill>
-                  <a:srgbClr val="007020"/>
-                </a:solidFill>
-                <a:latin typeface="Courier"/>
-              </a:rPr>
-              <a:t>&lt;-</a:t>
-            </a:r>
-            <a:r>
-              <a:rPr>
-                <a:latin typeface="Courier"/>
-              </a:rPr>
-              <a:t> </a:t>
-            </a:r>
-            <a:r>
-              <a:rPr>
                 <a:solidFill>
                   <a:srgbClr val="06287E"/>
                 </a:solidFill>
                 <a:latin typeface="Courier"/>
               </a:rPr>
-              <a:t>by</a:t>
-            </a:r>
-            <a:r>
-              <a:rPr>
-                <a:latin typeface="Courier"/>
-              </a:rPr>
-              <a:t>(fev</a:t>
+              <a:t>round</a:t>
+            </a:r>
+            <a:r>
+              <a:rPr>
+                <a:latin typeface="Courier"/>
+              </a:rPr>
+              <a:t>(fev_means, </a:t>
             </a:r>
             <a:r>
               <a:rPr>
                 <a:solidFill>
-                  <a:srgbClr val="4070A0"/>
+                  <a:srgbClr val="40A070"/>
                 </a:solidFill>
                 <a:latin typeface="Courier"/>
               </a:rPr>
-              <a:t>$</a:t>
-            </a:r>
-            <a:r>
-              <a:rPr>
-                <a:latin typeface="Courier"/>
-              </a:rPr>
-              <a:t>fev, fev</a:t>
-            </a:r>
-            <a:r>
-              <a:rPr>
-                <a:solidFill>
-                  <a:srgbClr val="4070A0"/>
-                </a:solidFill>
-                <a:latin typeface="Courier"/>
-              </a:rPr>
-              <a:t>$</a:t>
-            </a:r>
-            <a:r>
-              <a:rPr>
-                <a:latin typeface="Courier"/>
-              </a:rPr>
-              <a:t>smoke_factor, sd, </a:t>
-            </a:r>
-            <a:r>
-              <a:rPr>
-                <a:solidFill>
-                  <a:srgbClr val="7D9029"/>
-                </a:solidFill>
-                <a:latin typeface="Courier"/>
-              </a:rPr>
-              <a:t>na.rm=</a:t>
-            </a:r>
-            <a:r>
-              <a:rPr>
-                <a:solidFill>
-                  <a:srgbClr val="880000"/>
-                </a:solidFill>
-                <a:latin typeface="Courier"/>
-              </a:rPr>
-              <a:t>TRUE</a:t>
+              <a:t>1</a:t>
             </a:r>
             <a:r>
               <a:rPr>
                 <a:latin typeface="Courier"/>
               </a:rPr>
               <a:t>)</a:t>
-            </a:r>
-            <a:br/>
-            <a:r>
-              <a:rPr>
-                <a:latin typeface="Courier"/>
-              </a:rPr>
-              <a:t>fev_stdev</a:t>
             </a:r>
           </a:p>
           <a:p>
@@ -17433,10 +17442,10 @@
                 <a:latin typeface="Courier"/>
               </a:rPr>
               <a:t>## fev$smoke_factor: nonsmoker
-## [1] 3.196276
-## ------------------------------- 
+## [1] 2.6
+## ------------------------------ 
 ## fev$smoke_factor: smoker
-## [1] 3.251984</a:t>
+## [1] 3.3</a:t>
             </a:r>
           </a:p>
         </p:txBody>
@@ -17491,7 +17500,15 @@
             </a:r>
             <a:r>
               <a:rPr/>
-              <a:t>means</a:t>
+              <a:t>standard</a:t>
+            </a:r>
+            <a:r>
+              <a:rPr/>
+              <a:t> </a:t>
+            </a:r>
+            <a:r>
+              <a:rPr/>
+              <a:t>deviations</a:t>
             </a:r>
           </a:p>
         </p:txBody>
@@ -17518,7 +17535,7 @@
               <a:rPr>
                 <a:latin typeface="Courier"/>
               </a:rPr>
-              <a:t>colon </a:t>
+              <a:t>fev_stdev </a:t>
             </a:r>
             <a:r>
               <a:rPr>
@@ -17538,33 +17555,17 @@
             <a:r>
               <a:rPr>
                 <a:solidFill>
-                  <a:srgbClr val="4070A0"/>
+                  <a:srgbClr val="06287E"/>
                 </a:solidFill>
                 <a:latin typeface="Courier"/>
               </a:rPr>
-              <a:t>": "</a:t>
-            </a:r>
-            <a:br/>
-            <a:r>
-              <a:rPr>
-                <a:latin typeface="Courier"/>
-              </a:rPr>
-              <a:t>plus_minus </a:t>
-            </a:r>
-            <a:r>
-              <a:rPr>
-                <a:solidFill>
-                  <a:srgbClr val="007020"/>
-                </a:solidFill>
-                <a:latin typeface="Courier"/>
-              </a:rPr>
-              <a:t>&lt;-</a:t>
-            </a:r>
-            <a:r>
-              <a:rPr>
-                <a:latin typeface="Courier"/>
-              </a:rPr>
-              <a:t> </a:t>
+              <a:t>by</a:t>
+            </a:r>
+            <a:r>
+              <a:rPr>
+                <a:latin typeface="Courier"/>
+              </a:rPr>
+              <a:t>(fev</a:t>
             </a:r>
             <a:r>
               <a:rPr>
@@ -17573,7 +17574,52 @@
                 </a:solidFill>
                 <a:latin typeface="Courier"/>
               </a:rPr>
-              <a:t>"+/-"</a:t>
+              <a:t>$</a:t>
+            </a:r>
+            <a:r>
+              <a:rPr>
+                <a:latin typeface="Courier"/>
+              </a:rPr>
+              <a:t>fev, fev</a:t>
+            </a:r>
+            <a:r>
+              <a:rPr>
+                <a:solidFill>
+                  <a:srgbClr val="4070A0"/>
+                </a:solidFill>
+                <a:latin typeface="Courier"/>
+              </a:rPr>
+              <a:t>$</a:t>
+            </a:r>
+            <a:r>
+              <a:rPr>
+                <a:latin typeface="Courier"/>
+              </a:rPr>
+              <a:t>smoke_factor, sd, </a:t>
+            </a:r>
+            <a:r>
+              <a:rPr>
+                <a:solidFill>
+                  <a:srgbClr val="7D9029"/>
+                </a:solidFill>
+                <a:latin typeface="Courier"/>
+              </a:rPr>
+              <a:t>na.rm=</a:t>
+            </a:r>
+            <a:r>
+              <a:rPr>
+                <a:solidFill>
+                  <a:srgbClr val="880000"/>
+                </a:solidFill>
+                <a:latin typeface="Courier"/>
+              </a:rPr>
+              <a:t>TRUE</a:t>
+            </a:r>
+            <a:r>
+              <a:rPr>
+                <a:latin typeface="Courier"/>
+              </a:rPr>
+              <a:t>)</a:t>
             </a:r>
             <a:br/>
             <a:r>
@@ -17583,64 +17629,13 @@
                 </a:solidFill>
                 <a:latin typeface="Courier"/>
               </a:rPr>
-              <a:t>paste</a:t>
-            </a:r>
-            <a:r>
-              <a:rPr>
-                <a:latin typeface="Courier"/>
-              </a:rPr>
-              <a:t>(</a:t>
-            </a:r>
-            <a:br/>
-            <a:r>
-              <a:rPr>
-                <a:latin typeface="Courier"/>
-              </a:rPr>
-              <a:t>  </a:t>
-            </a:r>
-            <a:r>
-              <a:rPr>
-                <a:solidFill>
-                  <a:srgbClr val="06287E"/>
-                </a:solidFill>
-                <a:latin typeface="Courier"/>
-              </a:rPr>
-              <a:t>names</a:t>
-            </a:r>
-            <a:r>
-              <a:rPr>
-                <a:latin typeface="Courier"/>
-              </a:rPr>
-              <a:t>(fev_means),</a:t>
-            </a:r>
-            <a:br/>
-            <a:r>
-              <a:rPr>
-                <a:latin typeface="Courier"/>
-              </a:rPr>
-              <a:t>  colon,</a:t>
-            </a:r>
-            <a:br/>
-            <a:r>
-              <a:rPr>
-                <a:latin typeface="Courier"/>
-              </a:rPr>
-              <a:t>  </a:t>
-            </a:r>
-            <a:r>
-              <a:rPr>
-                <a:solidFill>
-                  <a:srgbClr val="06287E"/>
-                </a:solidFill>
-                <a:latin typeface="Courier"/>
-              </a:rPr>
               <a:t>round</a:t>
             </a:r>
             <a:r>
               <a:rPr>
                 <a:latin typeface="Courier"/>
               </a:rPr>
-              <a:t>(fev_means, </a:t>
+              <a:t>(fev_stdev, </a:t>
             </a:r>
             <a:r>
               <a:rPr>
@@ -17655,81 +17650,6 @@
               <a:rPr>
                 <a:latin typeface="Courier"/>
               </a:rPr>
-              <a:t>),</a:t>
-            </a:r>
-            <a:br/>
-            <a:r>
-              <a:rPr>
-                <a:latin typeface="Courier"/>
-              </a:rPr>
-              <a:t>  plus_minus,</a:t>
-            </a:r>
-            <a:br/>
-            <a:r>
-              <a:rPr>
-                <a:latin typeface="Courier"/>
-              </a:rPr>
-              <a:t>  </a:t>
-            </a:r>
-            <a:r>
-              <a:rPr>
-                <a:solidFill>
-                  <a:srgbClr val="06287E"/>
-                </a:solidFill>
-                <a:latin typeface="Courier"/>
-              </a:rPr>
-              <a:t>round</a:t>
-            </a:r>
-            <a:r>
-              <a:rPr>
-                <a:latin typeface="Courier"/>
-              </a:rPr>
-              <a:t>(fev_stdev, </a:t>
-            </a:r>
-            <a:r>
-              <a:rPr>
-                <a:solidFill>
-                  <a:srgbClr val="40A070"/>
-                </a:solidFill>
-                <a:latin typeface="Courier"/>
-              </a:rPr>
-              <a:t>1</a:t>
-            </a:r>
-            <a:r>
-              <a:rPr>
-                <a:latin typeface="Courier"/>
-              </a:rPr>
-              <a:t>),</a:t>
-            </a:r>
-            <a:br/>
-            <a:r>
-              <a:rPr>
-                <a:latin typeface="Courier"/>
-              </a:rPr>
-              <a:t>  </a:t>
-            </a:r>
-            <a:r>
-              <a:rPr>
-                <a:solidFill>
-                  <a:srgbClr val="7D9029"/>
-                </a:solidFill>
-                <a:latin typeface="Courier"/>
-              </a:rPr>
-              <a:t>sep=</a:t>
-            </a:r>
-            <a:r>
-              <a:rPr>
-                <a:solidFill>
-                  <a:srgbClr val="4070A0"/>
-                </a:solidFill>
-                <a:latin typeface="Courier"/>
-              </a:rPr>
-              <a:t>""</a:t>
-            </a:r>
-            <a:r>
-              <a:rPr>
-                <a:latin typeface="Courier"/>
-              </a:rPr>
               <a:t>)</a:t>
             </a:r>
           </a:p>
@@ -17741,8 +17661,11 @@
               <a:rPr>
                 <a:latin typeface="Courier"/>
               </a:rPr>
-              <a:t>## [1] "nonsmoker: 4.7+/-3.2"
-## [2] "smoker: 4.6+/-3.3"</a:t>
+              <a:t>## fev$smoke_factor: nonsmoker
+## [1] 0.9
+## ------------------------------ 
+## fev$smoke_factor: smoker
+## [1] 0.7</a:t>
             </a:r>
           </a:p>
         </p:txBody>
@@ -17824,7 +17747,7 @@
               <a:rPr>
                 <a:latin typeface="Courier"/>
               </a:rPr>
-              <a:t>age_means </a:t>
+              <a:t>colon </a:t>
             </a:r>
             <a:r>
               <a:rPr>
@@ -17844,17 +17767,33 @@
             <a:r>
               <a:rPr>
                 <a:solidFill>
-                  <a:srgbClr val="06287E"/>
+                  <a:srgbClr val="4070A0"/>
                 </a:solidFill>
                 <a:latin typeface="Courier"/>
               </a:rPr>
-              <a:t>by</a:t>
-            </a:r>
-            <a:r>
-              <a:rPr>
-                <a:latin typeface="Courier"/>
-              </a:rPr>
-              <a:t>(fev</a:t>
+              <a:t>": "</a:t>
+            </a:r>
+            <a:br/>
+            <a:r>
+              <a:rPr>
+                <a:latin typeface="Courier"/>
+              </a:rPr>
+              <a:t>plus_minus </a:t>
+            </a:r>
+            <a:r>
+              <a:rPr>
+                <a:solidFill>
+                  <a:srgbClr val="007020"/>
+                </a:solidFill>
+                <a:latin typeface="Courier"/>
+              </a:rPr>
+              <a:t>&lt;-</a:t>
+            </a:r>
+            <a:r>
+              <a:rPr>
+                <a:latin typeface="Courier"/>
+              </a:rPr>
+              <a:t> </a:t>
             </a:r>
             <a:r>
               <a:rPr>
@@ -17863,59 +17802,14 @@
                 </a:solidFill>
                 <a:latin typeface="Courier"/>
               </a:rPr>
-              <a:t>$</a:t>
-            </a:r>
-            <a:r>
-              <a:rPr>
-                <a:latin typeface="Courier"/>
-              </a:rPr>
-              <a:t>age, fev</a:t>
-            </a:r>
-            <a:r>
-              <a:rPr>
-                <a:solidFill>
-                  <a:srgbClr val="4070A0"/>
-                </a:solidFill>
-                <a:latin typeface="Courier"/>
-              </a:rPr>
-              <a:t>$</a:t>
-            </a:r>
-            <a:r>
-              <a:rPr>
-                <a:latin typeface="Courier"/>
-              </a:rPr>
-              <a:t>smoke_factor, mean, </a:t>
-            </a:r>
-            <a:r>
-              <a:rPr>
-                <a:solidFill>
-                  <a:srgbClr val="7D9029"/>
-                </a:solidFill>
-                <a:latin typeface="Courier"/>
-              </a:rPr>
-              <a:t>na.rm=</a:t>
-            </a:r>
-            <a:r>
-              <a:rPr>
-                <a:solidFill>
-                  <a:srgbClr val="880000"/>
-                </a:solidFill>
-                <a:latin typeface="Courier"/>
-              </a:rPr>
-              <a:t>TRUE</a:t>
-            </a:r>
-            <a:r>
-              <a:rPr>
-                <a:latin typeface="Courier"/>
-              </a:rPr>
-              <a:t>)</a:t>
+              <a:t>"+/-"</a:t>
             </a:r>
             <a:br/>
             <a:r>
               <a:rPr>
                 <a:latin typeface="Courier"/>
               </a:rPr>
-              <a:t>age_stdev </a:t>
+              <a:t>fev_stats </a:t>
             </a:r>
             <a:r>
               <a:rPr>
@@ -17939,131 +17833,21 @@
                 </a:solidFill>
                 <a:latin typeface="Courier"/>
               </a:rPr>
-              <a:t>by</a:t>
-            </a:r>
-            <a:r>
-              <a:rPr>
-                <a:latin typeface="Courier"/>
-              </a:rPr>
-              <a:t>(fev</a:t>
-            </a:r>
-            <a:r>
-              <a:rPr>
-                <a:solidFill>
-                  <a:srgbClr val="4070A0"/>
-                </a:solidFill>
-                <a:latin typeface="Courier"/>
-              </a:rPr>
-              <a:t>$</a:t>
-            </a:r>
-            <a:r>
-              <a:rPr>
-                <a:latin typeface="Courier"/>
-              </a:rPr>
-              <a:t>age, fev</a:t>
-            </a:r>
-            <a:r>
-              <a:rPr>
-                <a:solidFill>
-                  <a:srgbClr val="4070A0"/>
-                </a:solidFill>
-                <a:latin typeface="Courier"/>
-              </a:rPr>
-              <a:t>$</a:t>
-            </a:r>
-            <a:r>
-              <a:rPr>
-                <a:latin typeface="Courier"/>
-              </a:rPr>
-              <a:t>smoke_factor, sd, </a:t>
-            </a:r>
-            <a:r>
-              <a:rPr>
-                <a:solidFill>
-                  <a:srgbClr val="7D9029"/>
-                </a:solidFill>
-                <a:latin typeface="Courier"/>
-              </a:rPr>
-              <a:t>na.rm=</a:t>
-            </a:r>
-            <a:r>
-              <a:rPr>
-                <a:solidFill>
-                  <a:srgbClr val="880000"/>
-                </a:solidFill>
-                <a:latin typeface="Courier"/>
-              </a:rPr>
-              <a:t>TRUE</a:t>
-            </a:r>
-            <a:r>
-              <a:rPr>
-                <a:latin typeface="Courier"/>
-              </a:rPr>
-              <a:t>)</a:t>
+              <a:t>paste0</a:t>
+            </a:r>
+            <a:r>
+              <a:rPr>
+                <a:latin typeface="Courier"/>
+              </a:rPr>
+              <a:t>(</a:t>
             </a:r>
             <a:br/>
             <a:r>
               <a:rPr>
                 <a:latin typeface="Courier"/>
               </a:rPr>
-              <a:t>colon </a:t>
-            </a:r>
-            <a:r>
-              <a:rPr>
-                <a:solidFill>
-                  <a:srgbClr val="007020"/>
-                </a:solidFill>
-                <a:latin typeface="Courier"/>
-              </a:rPr>
-              <a:t>&lt;-</a:t>
-            </a:r>
-            <a:r>
-              <a:rPr>
-                <a:latin typeface="Courier"/>
-              </a:rPr>
-              <a:t> </a:t>
-            </a:r>
-            <a:r>
-              <a:rPr>
-                <a:solidFill>
-                  <a:srgbClr val="4070A0"/>
-                </a:solidFill>
-                <a:latin typeface="Courier"/>
-              </a:rPr>
-              <a:t>": "</a:t>
-            </a:r>
-            <a:br/>
-            <a:r>
-              <a:rPr>
-                <a:latin typeface="Courier"/>
-              </a:rPr>
-              <a:t>plus_minus </a:t>
-            </a:r>
-            <a:r>
-              <a:rPr>
-                <a:solidFill>
-                  <a:srgbClr val="007020"/>
-                </a:solidFill>
-                <a:latin typeface="Courier"/>
-              </a:rPr>
-              <a:t>&lt;-</a:t>
-            </a:r>
-            <a:r>
-              <a:rPr>
-                <a:latin typeface="Courier"/>
-              </a:rPr>
-              <a:t> </a:t>
-            </a:r>
-            <a:r>
-              <a:rPr>
-                <a:solidFill>
-                  <a:srgbClr val="4070A0"/>
-                </a:solidFill>
-                <a:latin typeface="Courier"/>
-              </a:rPr>
-              <a:t>"+/-"</a:t>
-            </a:r>
-            <a:br/>
+              <a:t>  </a:t>
+            </a:r>
             <a:r>
               <a:rPr>
                 <a:solidFill>
@@ -18071,13 +17855,20 @@
                 </a:solidFill>
                 <a:latin typeface="Courier"/>
               </a:rPr>
-              <a:t>paste</a:t>
-            </a:r>
-            <a:r>
-              <a:rPr>
-                <a:latin typeface="Courier"/>
-              </a:rPr>
-              <a:t>(</a:t>
+              <a:t>names</a:t>
+            </a:r>
+            <a:r>
+              <a:rPr>
+                <a:latin typeface="Courier"/>
+              </a:rPr>
+              <a:t>(fev_means),</a:t>
+            </a:r>
+            <a:br/>
+            <a:r>
+              <a:rPr>
+                <a:latin typeface="Courier"/>
+              </a:rPr>
+              <a:t>  colon,</a:t>
             </a:r>
             <a:br/>
             <a:r>
@@ -18093,20 +17884,35 @@
                 </a:solidFill>
                 <a:latin typeface="Courier"/>
               </a:rPr>
-              <a:t>names</a:t>
-            </a:r>
-            <a:r>
-              <a:rPr>
-                <a:latin typeface="Courier"/>
-              </a:rPr>
-              <a:t>(age_means),</a:t>
+              <a:t>round</a:t>
+            </a:r>
+            <a:r>
+              <a:rPr>
+                <a:latin typeface="Courier"/>
+              </a:rPr>
+              <a:t>(fev_means, </a:t>
+            </a:r>
+            <a:r>
+              <a:rPr>
+                <a:solidFill>
+                  <a:srgbClr val="40A070"/>
+                </a:solidFill>
+                <a:latin typeface="Courier"/>
+              </a:rPr>
+              <a:t>1</a:t>
+            </a:r>
+            <a:r>
+              <a:rPr>
+                <a:latin typeface="Courier"/>
+              </a:rPr>
+              <a:t>),</a:t>
             </a:r>
             <a:br/>
             <a:r>
               <a:rPr>
                 <a:latin typeface="Courier"/>
               </a:rPr>
-              <a:t>  colon,</a:t>
+              <a:t>  plus_minus,</a:t>
             </a:r>
             <a:br/>
             <a:r>
@@ -18128,7 +17934,7 @@
               <a:rPr>
                 <a:latin typeface="Courier"/>
               </a:rPr>
-              <a:t>(age_means,</a:t>
+              <a:t>(fev_stdev, </a:t>
             </a:r>
             <a:r>
               <a:rPr>
@@ -18143,93 +17949,7 @@
               <a:rPr>
                 <a:latin typeface="Courier"/>
               </a:rPr>
-              <a:t>),</a:t>
-            </a:r>
-            <a:br/>
-            <a:r>
-              <a:rPr>
-                <a:latin typeface="Courier"/>
-              </a:rPr>
-              <a:t>  plus_minus,</a:t>
-            </a:r>
-            <a:br/>
-            <a:r>
-              <a:rPr>
-                <a:latin typeface="Courier"/>
-              </a:rPr>
-              <a:t>  </a:t>
-            </a:r>
-            <a:r>
-              <a:rPr>
-                <a:solidFill>
-                  <a:srgbClr val="06287E"/>
-                </a:solidFill>
-                <a:latin typeface="Courier"/>
-              </a:rPr>
-              <a:t>round</a:t>
-            </a:r>
-            <a:r>
-              <a:rPr>
-                <a:latin typeface="Courier"/>
-              </a:rPr>
-              <a:t>(age_stdev,</a:t>
-            </a:r>
-            <a:r>
-              <a:rPr>
-                <a:solidFill>
-                  <a:srgbClr val="40A070"/>
-                </a:solidFill>
-                <a:latin typeface="Courier"/>
-              </a:rPr>
-              <a:t>1</a:t>
-            </a:r>
-            <a:r>
-              <a:rPr>
-                <a:latin typeface="Courier"/>
-              </a:rPr>
-              <a:t>),</a:t>
-            </a:r>
-            <a:br/>
-            <a:r>
-              <a:rPr>
-                <a:latin typeface="Courier"/>
-              </a:rPr>
-              <a:t>  </a:t>
-            </a:r>
-            <a:r>
-              <a:rPr>
-                <a:solidFill>
-                  <a:srgbClr val="7D9029"/>
-                </a:solidFill>
-                <a:latin typeface="Courier"/>
-              </a:rPr>
-              <a:t>sep=</a:t>
-            </a:r>
-            <a:r>
-              <a:rPr>
-                <a:solidFill>
-                  <a:srgbClr val="4070A0"/>
-                </a:solidFill>
-                <a:latin typeface="Courier"/>
-              </a:rPr>
-              <a:t>""</a:t>
-            </a:r>
-            <a:r>
-              <a:rPr>
-                <a:latin typeface="Courier"/>
-              </a:rPr>
-              <a:t>)</a:t>
-            </a:r>
-          </a:p>
-          <a:p>
-            <a:pPr lvl="0" indent="0">
-              <a:buNone/>
-            </a:pPr>
-            <a:r>
-              <a:rPr>
-                <a:latin typeface="Courier"/>
-              </a:rPr>
-              <a:t>## [1] "nonsmoker: 1+/-0" "smoker: 1+/-0"</a:t>
+              <a:t>))</a:t>
             </a:r>
           </a:p>
         </p:txBody>
@@ -18276,15 +17996,31 @@
             </a:pPr>
             <a:r>
               <a:rPr/>
-              <a:t>Break</a:t>
-            </a:r>
-            <a:r>
-              <a:rPr/>
-              <a:t> </a:t>
-            </a:r>
-            <a:r>
-              <a:rPr/>
-              <a:t>#3</a:t>
+              <a:t>Group</a:t>
+            </a:r>
+            <a:r>
+              <a:rPr/>
+              <a:t> </a:t>
+            </a:r>
+            <a:r>
+              <a:rPr/>
+              <a:t>means</a:t>
+            </a:r>
+            <a:r>
+              <a:rPr/>
+              <a:t> </a:t>
+            </a:r>
+            <a:r>
+              <a:rPr/>
+              <a:t>for</a:t>
+            </a:r>
+            <a:r>
+              <a:rPr/>
+              <a:t> </a:t>
+            </a:r>
+            <a:r>
+              <a:rPr/>
+              <a:t>age</a:t>
             </a:r>
           </a:p>
         </p:txBody>
@@ -18304,45 +18040,429 @@
           <a:bodyPr/>
           <a:lstStyle/>
           <a:p>
-            <a:pPr lvl="1"/>
-            <a:r>
-              <a:rPr/>
-              <a:t>What have you learned?</a:t>
-            </a:r>
-          </a:p>
-          <a:p>
-            <a:pPr lvl="2"/>
-            <a:r>
-              <a:rPr/>
-              <a:t>Review earlier material</a:t>
-            </a:r>
-          </a:p>
-          <a:p>
-            <a:pPr lvl="2"/>
-            <a:r>
-              <a:rPr/>
-              <a:t>Boxplots</a:t>
-            </a:r>
-          </a:p>
-          <a:p>
-            <a:pPr lvl="2"/>
-            <a:r>
-              <a:rPr/>
-              <a:t>Group means and standard deviations</a:t>
-            </a:r>
-          </a:p>
-          <a:p>
-            <a:pPr lvl="1"/>
-            <a:r>
-              <a:rPr/>
-              <a:t>What’s coming up next?</a:t>
-            </a:r>
-          </a:p>
-          <a:p>
-            <a:pPr lvl="2"/>
-            <a:r>
-              <a:rPr/>
-              <a:t>Datasets needed for your homework</a:t>
+            <a:pPr lvl="0" indent="0">
+              <a:buNone/>
+            </a:pPr>
+            <a:r>
+              <a:rPr>
+                <a:latin typeface="Courier"/>
+              </a:rPr>
+              <a:t>age_means </a:t>
+            </a:r>
+            <a:r>
+              <a:rPr>
+                <a:solidFill>
+                  <a:srgbClr val="007020"/>
+                </a:solidFill>
+                <a:latin typeface="Courier"/>
+              </a:rPr>
+              <a:t>&lt;-</a:t>
+            </a:r>
+            <a:r>
+              <a:rPr>
+                <a:latin typeface="Courier"/>
+              </a:rPr>
+              <a:t> </a:t>
+            </a:r>
+            <a:r>
+              <a:rPr>
+                <a:solidFill>
+                  <a:srgbClr val="06287E"/>
+                </a:solidFill>
+                <a:latin typeface="Courier"/>
+              </a:rPr>
+              <a:t>by</a:t>
+            </a:r>
+            <a:r>
+              <a:rPr>
+                <a:latin typeface="Courier"/>
+              </a:rPr>
+              <a:t>(fev</a:t>
+            </a:r>
+            <a:r>
+              <a:rPr>
+                <a:solidFill>
+                  <a:srgbClr val="4070A0"/>
+                </a:solidFill>
+                <a:latin typeface="Courier"/>
+              </a:rPr>
+              <a:t>$</a:t>
+            </a:r>
+            <a:r>
+              <a:rPr>
+                <a:latin typeface="Courier"/>
+              </a:rPr>
+              <a:t>age, fev</a:t>
+            </a:r>
+            <a:r>
+              <a:rPr>
+                <a:solidFill>
+                  <a:srgbClr val="4070A0"/>
+                </a:solidFill>
+                <a:latin typeface="Courier"/>
+              </a:rPr>
+              <a:t>$</a:t>
+            </a:r>
+            <a:r>
+              <a:rPr>
+                <a:latin typeface="Courier"/>
+              </a:rPr>
+              <a:t>smoke_factor, mean, </a:t>
+            </a:r>
+            <a:r>
+              <a:rPr>
+                <a:solidFill>
+                  <a:srgbClr val="7D9029"/>
+                </a:solidFill>
+                <a:latin typeface="Courier"/>
+              </a:rPr>
+              <a:t>na.rm=</a:t>
+            </a:r>
+            <a:r>
+              <a:rPr>
+                <a:solidFill>
+                  <a:srgbClr val="880000"/>
+                </a:solidFill>
+                <a:latin typeface="Courier"/>
+              </a:rPr>
+              <a:t>TRUE</a:t>
+            </a:r>
+            <a:r>
+              <a:rPr>
+                <a:latin typeface="Courier"/>
+              </a:rPr>
+              <a:t>)</a:t>
+            </a:r>
+            <a:br/>
+            <a:r>
+              <a:rPr>
+                <a:latin typeface="Courier"/>
+              </a:rPr>
+              <a:t>age_stdev </a:t>
+            </a:r>
+            <a:r>
+              <a:rPr>
+                <a:solidFill>
+                  <a:srgbClr val="007020"/>
+                </a:solidFill>
+                <a:latin typeface="Courier"/>
+              </a:rPr>
+              <a:t>&lt;-</a:t>
+            </a:r>
+            <a:r>
+              <a:rPr>
+                <a:latin typeface="Courier"/>
+              </a:rPr>
+              <a:t> </a:t>
+            </a:r>
+            <a:r>
+              <a:rPr>
+                <a:solidFill>
+                  <a:srgbClr val="06287E"/>
+                </a:solidFill>
+                <a:latin typeface="Courier"/>
+              </a:rPr>
+              <a:t>by</a:t>
+            </a:r>
+            <a:r>
+              <a:rPr>
+                <a:latin typeface="Courier"/>
+              </a:rPr>
+              <a:t>(fev</a:t>
+            </a:r>
+            <a:r>
+              <a:rPr>
+                <a:solidFill>
+                  <a:srgbClr val="4070A0"/>
+                </a:solidFill>
+                <a:latin typeface="Courier"/>
+              </a:rPr>
+              <a:t>$</a:t>
+            </a:r>
+            <a:r>
+              <a:rPr>
+                <a:latin typeface="Courier"/>
+              </a:rPr>
+              <a:t>age, fev</a:t>
+            </a:r>
+            <a:r>
+              <a:rPr>
+                <a:solidFill>
+                  <a:srgbClr val="4070A0"/>
+                </a:solidFill>
+                <a:latin typeface="Courier"/>
+              </a:rPr>
+              <a:t>$</a:t>
+            </a:r>
+            <a:r>
+              <a:rPr>
+                <a:latin typeface="Courier"/>
+              </a:rPr>
+              <a:t>smoke_factor, sd, </a:t>
+            </a:r>
+            <a:r>
+              <a:rPr>
+                <a:solidFill>
+                  <a:srgbClr val="7D9029"/>
+                </a:solidFill>
+                <a:latin typeface="Courier"/>
+              </a:rPr>
+              <a:t>na.rm=</a:t>
+            </a:r>
+            <a:r>
+              <a:rPr>
+                <a:solidFill>
+                  <a:srgbClr val="880000"/>
+                </a:solidFill>
+                <a:latin typeface="Courier"/>
+              </a:rPr>
+              <a:t>TRUE</a:t>
+            </a:r>
+            <a:r>
+              <a:rPr>
+                <a:latin typeface="Courier"/>
+              </a:rPr>
+              <a:t>)</a:t>
+            </a:r>
+            <a:br/>
+            <a:r>
+              <a:rPr>
+                <a:latin typeface="Courier"/>
+              </a:rPr>
+              <a:t>colon </a:t>
+            </a:r>
+            <a:r>
+              <a:rPr>
+                <a:solidFill>
+                  <a:srgbClr val="007020"/>
+                </a:solidFill>
+                <a:latin typeface="Courier"/>
+              </a:rPr>
+              <a:t>&lt;-</a:t>
+            </a:r>
+            <a:r>
+              <a:rPr>
+                <a:latin typeface="Courier"/>
+              </a:rPr>
+              <a:t> </a:t>
+            </a:r>
+            <a:r>
+              <a:rPr>
+                <a:solidFill>
+                  <a:srgbClr val="4070A0"/>
+                </a:solidFill>
+                <a:latin typeface="Courier"/>
+              </a:rPr>
+              <a:t>": "</a:t>
+            </a:r>
+            <a:br/>
+            <a:r>
+              <a:rPr>
+                <a:latin typeface="Courier"/>
+              </a:rPr>
+              <a:t>plus_minus </a:t>
+            </a:r>
+            <a:r>
+              <a:rPr>
+                <a:solidFill>
+                  <a:srgbClr val="007020"/>
+                </a:solidFill>
+                <a:latin typeface="Courier"/>
+              </a:rPr>
+              <a:t>&lt;-</a:t>
+            </a:r>
+            <a:r>
+              <a:rPr>
+                <a:latin typeface="Courier"/>
+              </a:rPr>
+              <a:t> </a:t>
+            </a:r>
+            <a:r>
+              <a:rPr>
+                <a:solidFill>
+                  <a:srgbClr val="4070A0"/>
+                </a:solidFill>
+                <a:latin typeface="Courier"/>
+              </a:rPr>
+              <a:t>"+/-"</a:t>
+            </a:r>
+            <a:br/>
+            <a:r>
+              <a:rPr>
+                <a:latin typeface="Courier"/>
+              </a:rPr>
+              <a:t>age_stats </a:t>
+            </a:r>
+            <a:r>
+              <a:rPr>
+                <a:solidFill>
+                  <a:srgbClr val="007020"/>
+                </a:solidFill>
+                <a:latin typeface="Courier"/>
+              </a:rPr>
+              <a:t>&lt;-</a:t>
+            </a:r>
+            <a:r>
+              <a:rPr>
+                <a:latin typeface="Courier"/>
+              </a:rPr>
+              <a:t> </a:t>
+            </a:r>
+            <a:r>
+              <a:rPr>
+                <a:solidFill>
+                  <a:srgbClr val="06287E"/>
+                </a:solidFill>
+                <a:latin typeface="Courier"/>
+              </a:rPr>
+              <a:t>paste0</a:t>
+            </a:r>
+            <a:r>
+              <a:rPr>
+                <a:latin typeface="Courier"/>
+              </a:rPr>
+              <a:t>(</a:t>
+            </a:r>
+            <a:br/>
+            <a:r>
+              <a:rPr>
+                <a:latin typeface="Courier"/>
+              </a:rPr>
+              <a:t>  </a:t>
+            </a:r>
+            <a:r>
+              <a:rPr>
+                <a:solidFill>
+                  <a:srgbClr val="06287E"/>
+                </a:solidFill>
+                <a:latin typeface="Courier"/>
+              </a:rPr>
+              <a:t>names</a:t>
+            </a:r>
+            <a:r>
+              <a:rPr>
+                <a:latin typeface="Courier"/>
+              </a:rPr>
+              <a:t>(age_means),</a:t>
+            </a:r>
+            <a:br/>
+            <a:r>
+              <a:rPr>
+                <a:latin typeface="Courier"/>
+              </a:rPr>
+              <a:t>  colon,</a:t>
+            </a:r>
+            <a:br/>
+            <a:r>
+              <a:rPr>
+                <a:latin typeface="Courier"/>
+              </a:rPr>
+              <a:t>  </a:t>
+            </a:r>
+            <a:r>
+              <a:rPr>
+                <a:solidFill>
+                  <a:srgbClr val="06287E"/>
+                </a:solidFill>
+                <a:latin typeface="Courier"/>
+              </a:rPr>
+              <a:t>round</a:t>
+            </a:r>
+            <a:r>
+              <a:rPr>
+                <a:latin typeface="Courier"/>
+              </a:rPr>
+              <a:t>(age_means,</a:t>
+            </a:r>
+            <a:r>
+              <a:rPr>
+                <a:solidFill>
+                  <a:srgbClr val="40A070"/>
+                </a:solidFill>
+                <a:latin typeface="Courier"/>
+              </a:rPr>
+              <a:t>1</a:t>
+            </a:r>
+            <a:r>
+              <a:rPr>
+                <a:latin typeface="Courier"/>
+              </a:rPr>
+              <a:t>),</a:t>
+            </a:r>
+            <a:br/>
+            <a:r>
+              <a:rPr>
+                <a:latin typeface="Courier"/>
+              </a:rPr>
+              <a:t>  plus_minus,</a:t>
+            </a:r>
+            <a:br/>
+            <a:r>
+              <a:rPr>
+                <a:latin typeface="Courier"/>
+              </a:rPr>
+              <a:t>  </a:t>
+            </a:r>
+            <a:r>
+              <a:rPr>
+                <a:solidFill>
+                  <a:srgbClr val="06287E"/>
+                </a:solidFill>
+                <a:latin typeface="Courier"/>
+              </a:rPr>
+              <a:t>round</a:t>
+            </a:r>
+            <a:r>
+              <a:rPr>
+                <a:latin typeface="Courier"/>
+              </a:rPr>
+              <a:t>(age_stdev,</a:t>
+            </a:r>
+            <a:r>
+              <a:rPr>
+                <a:solidFill>
+                  <a:srgbClr val="40A070"/>
+                </a:solidFill>
+                <a:latin typeface="Courier"/>
+              </a:rPr>
+              <a:t>1</a:t>
+            </a:r>
+            <a:r>
+              <a:rPr>
+                <a:latin typeface="Courier"/>
+              </a:rPr>
+              <a:t>),</a:t>
+            </a:r>
+            <a:br/>
+            <a:r>
+              <a:rPr>
+                <a:latin typeface="Courier"/>
+              </a:rPr>
+              <a:t>  </a:t>
+            </a:r>
+            <a:r>
+              <a:rPr>
+                <a:solidFill>
+                  <a:srgbClr val="7D9029"/>
+                </a:solidFill>
+                <a:latin typeface="Courier"/>
+              </a:rPr>
+              <a:t>sep=</a:t>
+            </a:r>
+            <a:r>
+              <a:rPr>
+                <a:solidFill>
+                  <a:srgbClr val="4070A0"/>
+                </a:solidFill>
+                <a:latin typeface="Courier"/>
+              </a:rPr>
+              <a:t>""</a:t>
+            </a:r>
+            <a:r>
+              <a:rPr>
+                <a:latin typeface="Courier"/>
+              </a:rPr>
+              <a:t>)</a:t>
             </a:r>
           </a:p>
         </p:txBody>
@@ -18389,23 +18509,31 @@
             </a:pPr>
             <a:r>
               <a:rPr/>
-              <a:t>The</a:t>
-            </a:r>
-            <a:r>
-              <a:rPr/>
-              <a:t> </a:t>
-            </a:r>
-            <a:r>
-              <a:rPr/>
-              <a:t>Albuquerque</a:t>
-            </a:r>
-            <a:r>
-              <a:rPr/>
-              <a:t> </a:t>
-            </a:r>
-            <a:r>
-              <a:rPr/>
-              <a:t>dataset</a:t>
+              <a:t>Explanation</a:t>
+            </a:r>
+            <a:r>
+              <a:rPr/>
+              <a:t> </a:t>
+            </a:r>
+            <a:r>
+              <a:rPr/>
+              <a:t>for</a:t>
+            </a:r>
+            <a:r>
+              <a:rPr/>
+              <a:t> </a:t>
+            </a:r>
+            <a:r>
+              <a:rPr/>
+              <a:t>counter-intuitive</a:t>
+            </a:r>
+            <a:r>
+              <a:rPr/>
+              <a:t> </a:t>
+            </a:r>
+            <a:r>
+              <a:rPr/>
+              <a:t>result</a:t>
             </a:r>
           </a:p>
         </p:txBody>
@@ -18425,35 +18553,49 @@
           <a:bodyPr/>
           <a:lstStyle/>
           <a:p>
-            <a:pPr lvl="1"/>
-            <a:r>
-              <a:rPr/>
-              <a:t>Housing data dictionary</a:t>
-            </a:r>
-          </a:p>
-          <a:p>
-            <a:pPr lvl="2"/>
-            <a:r>
-              <a:rPr>
-                <a:hlinkClick r:id="rId3"/>
-              </a:rPr>
-              <a:t>http://www.pmean.com/introduction-to-r/data/albuquerque-data-dictionary.txt</a:t>
-            </a:r>
-          </a:p>
-          <a:p>
-            <a:pPr lvl="1"/>
-            <a:r>
-              <a:rPr/>
-              <a:t>Housing dataset</a:t>
-            </a:r>
-          </a:p>
-          <a:p>
-            <a:pPr lvl="2"/>
-            <a:r>
-              <a:rPr>
-                <a:hlinkClick r:id="rId4"/>
-              </a:rPr>
-              <a:t>http://www.pmean.com/introduction-to-r/data/albuquerque-housing.txt</a:t>
+            <a:pPr lvl="0" indent="0">
+              <a:buNone/>
+            </a:pPr>
+            <a:r>
+              <a:rPr>
+                <a:latin typeface="Courier"/>
+              </a:rPr>
+              <a:t>fev_stats</a:t>
+            </a:r>
+          </a:p>
+          <a:p>
+            <a:pPr lvl="0" indent="0">
+              <a:buNone/>
+            </a:pPr>
+            <a:r>
+              <a:rPr>
+                <a:latin typeface="Courier"/>
+              </a:rPr>
+              <a:t>## [1] "nonsmoker: 2.6+/-0.9"
+## [2] "smoker: 3.3+/-0.7"</a:t>
+            </a:r>
+          </a:p>
+          <a:p>
+            <a:pPr lvl="0" indent="0">
+              <a:buNone/>
+            </a:pPr>
+            <a:r>
+              <a:rPr>
+                <a:latin typeface="Courier"/>
+              </a:rPr>
+              <a:t>age_stats</a:t>
+            </a:r>
+          </a:p>
+          <a:p>
+            <a:pPr lvl="0" indent="0">
+              <a:buNone/>
+            </a:pPr>
+            <a:r>
+              <a:rPr>
+                <a:latin typeface="Courier"/>
+              </a:rPr>
+              <a:t>## [1] "nonsmoker: 9.5+/-2.7"
+## [2] "smoker: 13.5+/-2.3"</a:t>
             </a:r>
           </a:p>
         </p:txBody>
@@ -18601,6 +18743,230 @@
 </file>
 
 <file path=ppt/slides/slide30.xml><?xml version="1.0" encoding="utf-8"?>
+<p:sld xmlns:a="http://schemas.openxmlformats.org/drawingml/2006/main" xmlns:r="http://schemas.openxmlformats.org/officeDocument/2006/relationships" xmlns:p="http://schemas.openxmlformats.org/presentationml/2006/main">
+  <p:cSld>
+    <p:spTree>
+      <p:nvGrpSpPr>
+        <p:cNvPr id="1" name=""/>
+        <p:cNvGrpSpPr/>
+        <p:nvPr/>
+      </p:nvGrpSpPr>
+      <p:grpSpPr>
+        <a:xfrm>
+          <a:off x="0" y="0"/>
+          <a:ext cx="0" cy="0"/>
+          <a:chOff x="0" y="0"/>
+          <a:chExt cx="0" cy="0"/>
+        </a:xfrm>
+      </p:grpSpPr>
+      <p:sp>
+        <p:nvSpPr>
+          <p:cNvPr id="2" name="Title 1"/>
+          <p:cNvSpPr>
+            <a:spLocks noGrp="1"/>
+          </p:cNvSpPr>
+          <p:nvPr>
+            <p:ph type="title"/>
+          </p:nvPr>
+        </p:nvSpPr>
+        <p:spPr/>
+        <p:txBody>
+          <a:bodyPr/>
+          <a:lstStyle/>
+          <a:p>
+            <a:pPr lvl="0" marL="0" indent="0">
+              <a:buNone/>
+            </a:pPr>
+            <a:r>
+              <a:rPr/>
+              <a:t>Break</a:t>
+            </a:r>
+            <a:r>
+              <a:rPr/>
+              <a:t> </a:t>
+            </a:r>
+            <a:r>
+              <a:rPr/>
+              <a:t>#3</a:t>
+            </a:r>
+          </a:p>
+        </p:txBody>
+      </p:sp>
+      <p:sp>
+        <p:nvSpPr>
+          <p:cNvPr id="3" name="Content Placeholder 2"/>
+          <p:cNvSpPr>
+            <a:spLocks noGrp="1"/>
+          </p:cNvSpPr>
+          <p:nvPr>
+            <p:ph idx="1"/>
+          </p:nvPr>
+        </p:nvSpPr>
+        <p:spPr/>
+        <p:txBody>
+          <a:bodyPr/>
+          <a:lstStyle/>
+          <a:p>
+            <a:pPr lvl="1"/>
+            <a:r>
+              <a:rPr/>
+              <a:t>What have you learned?</a:t>
+            </a:r>
+          </a:p>
+          <a:p>
+            <a:pPr lvl="2"/>
+            <a:r>
+              <a:rPr/>
+              <a:t>Review earlier material</a:t>
+            </a:r>
+          </a:p>
+          <a:p>
+            <a:pPr lvl="2"/>
+            <a:r>
+              <a:rPr/>
+              <a:t>Boxplots</a:t>
+            </a:r>
+          </a:p>
+          <a:p>
+            <a:pPr lvl="2"/>
+            <a:r>
+              <a:rPr/>
+              <a:t>Group means and standard deviations</a:t>
+            </a:r>
+          </a:p>
+          <a:p>
+            <a:pPr lvl="1"/>
+            <a:r>
+              <a:rPr/>
+              <a:t>What’s coming up next?</a:t>
+            </a:r>
+          </a:p>
+          <a:p>
+            <a:pPr lvl="2"/>
+            <a:r>
+              <a:rPr/>
+              <a:t>Datasets needed for your homework</a:t>
+            </a:r>
+          </a:p>
+        </p:txBody>
+      </p:sp>
+    </p:spTree>
+  </p:cSld>
+</p:sld>
+</file>
+
+<file path=ppt/slides/slide31.xml><?xml version="1.0" encoding="utf-8"?>
+<p:sld xmlns:a="http://schemas.openxmlformats.org/drawingml/2006/main" xmlns:r="http://schemas.openxmlformats.org/officeDocument/2006/relationships" xmlns:p="http://schemas.openxmlformats.org/presentationml/2006/main">
+  <p:cSld>
+    <p:spTree>
+      <p:nvGrpSpPr>
+        <p:cNvPr id="1" name=""/>
+        <p:cNvGrpSpPr/>
+        <p:nvPr/>
+      </p:nvGrpSpPr>
+      <p:grpSpPr>
+        <a:xfrm>
+          <a:off x="0" y="0"/>
+          <a:ext cx="0" cy="0"/>
+          <a:chOff x="0" y="0"/>
+          <a:chExt cx="0" cy="0"/>
+        </a:xfrm>
+      </p:grpSpPr>
+      <p:sp>
+        <p:nvSpPr>
+          <p:cNvPr id="2" name="Title 1"/>
+          <p:cNvSpPr>
+            <a:spLocks noGrp="1"/>
+          </p:cNvSpPr>
+          <p:nvPr>
+            <p:ph type="title"/>
+          </p:nvPr>
+        </p:nvSpPr>
+        <p:spPr/>
+        <p:txBody>
+          <a:bodyPr/>
+          <a:lstStyle/>
+          <a:p>
+            <a:pPr lvl="0" marL="0" indent="0">
+              <a:buNone/>
+            </a:pPr>
+            <a:r>
+              <a:rPr/>
+              <a:t>The</a:t>
+            </a:r>
+            <a:r>
+              <a:rPr/>
+              <a:t> </a:t>
+            </a:r>
+            <a:r>
+              <a:rPr/>
+              <a:t>Albuquerque</a:t>
+            </a:r>
+            <a:r>
+              <a:rPr/>
+              <a:t> </a:t>
+            </a:r>
+            <a:r>
+              <a:rPr/>
+              <a:t>dataset</a:t>
+            </a:r>
+          </a:p>
+        </p:txBody>
+      </p:sp>
+      <p:sp>
+        <p:nvSpPr>
+          <p:cNvPr id="3" name="Content Placeholder 2"/>
+          <p:cNvSpPr>
+            <a:spLocks noGrp="1"/>
+          </p:cNvSpPr>
+          <p:nvPr>
+            <p:ph idx="1"/>
+          </p:nvPr>
+        </p:nvSpPr>
+        <p:spPr/>
+        <p:txBody>
+          <a:bodyPr/>
+          <a:lstStyle/>
+          <a:p>
+            <a:pPr lvl="1"/>
+            <a:r>
+              <a:rPr/>
+              <a:t>Housing data dictionary</a:t>
+            </a:r>
+          </a:p>
+          <a:p>
+            <a:pPr lvl="2"/>
+            <a:r>
+              <a:rPr>
+                <a:hlinkClick r:id="rId3"/>
+              </a:rPr>
+              <a:t>http://www.pmean.com/introduction-to-r/data/albuquerque-data-dictionary.txt</a:t>
+            </a:r>
+          </a:p>
+          <a:p>
+            <a:pPr lvl="1"/>
+            <a:r>
+              <a:rPr/>
+              <a:t>Housing dataset</a:t>
+            </a:r>
+          </a:p>
+          <a:p>
+            <a:pPr lvl="2"/>
+            <a:r>
+              <a:rPr>
+                <a:hlinkClick r:id="rId4"/>
+              </a:rPr>
+              <a:t>http://www.pmean.com/introduction-to-r/data/albuquerque-housing.txt</a:t>
+            </a:r>
+          </a:p>
+        </p:txBody>
+      </p:sp>
+    </p:spTree>
+  </p:cSld>
+</p:sld>
+</file>
+
+<file path=ppt/slides/slide32.xml><?xml version="1.0" encoding="utf-8"?>
 <p:sld xmlns:a="http://schemas.openxmlformats.org/drawingml/2006/main" xmlns:r="http://schemas.openxmlformats.org/officeDocument/2006/relationships" xmlns:p="http://schemas.openxmlformats.org/presentationml/2006/main">
   <p:cSld>
     <p:spTree>
@@ -18763,7 +19129,7 @@
 </p:sld>
 </file>
 
-<file path=ppt/slides/slide31.xml><?xml version="1.0" encoding="utf-8"?>
+<file path=ppt/slides/slide33.xml><?xml version="1.0" encoding="utf-8"?>
 <p:sld xmlns:a="http://schemas.openxmlformats.org/drawingml/2006/main" xmlns:r="http://schemas.openxmlformats.org/officeDocument/2006/relationships" xmlns:p="http://schemas.openxmlformats.org/presentationml/2006/main">
   <p:cSld>
     <p:spTree>
@@ -18958,7 +19324,7 @@
 </p:sld>
 </file>
 
-<file path=ppt/slides/slide32.xml><?xml version="1.0" encoding="utf-8"?>
+<file path=ppt/slides/slide34.xml><?xml version="1.0" encoding="utf-8"?>
 <p:sld xmlns:a="http://schemas.openxmlformats.org/drawingml/2006/main" xmlns:r="http://schemas.openxmlformats.org/officeDocument/2006/relationships" xmlns:p="http://schemas.openxmlformats.org/presentationml/2006/main">
   <p:cSld>
     <p:spTree>
@@ -19069,7 +19435,7 @@
 </p:sld>
 </file>
 
-<file path=ppt/slides/slide33.xml><?xml version="1.0" encoding="utf-8"?>
+<file path=ppt/slides/slide35.xml><?xml version="1.0" encoding="utf-8"?>
 <p:sld xmlns:a="http://schemas.openxmlformats.org/drawingml/2006/main" xmlns:r="http://schemas.openxmlformats.org/officeDocument/2006/relationships" xmlns:p="http://schemas.openxmlformats.org/presentationml/2006/main">
   <p:cSld>
     <p:spTree>
@@ -19232,7 +19598,7 @@
 </p:sld>
 </file>
 
-<file path=ppt/slides/slide34.xml><?xml version="1.0" encoding="utf-8"?>
+<file path=ppt/slides/slide36.xml><?xml version="1.0" encoding="utf-8"?>
 <p:sld xmlns:a="http://schemas.openxmlformats.org/drawingml/2006/main" xmlns:r="http://schemas.openxmlformats.org/officeDocument/2006/relationships" xmlns:p="http://schemas.openxmlformats.org/presentationml/2006/main">
   <p:cSld>
     <p:spTree>
@@ -19973,16 +20339,6 @@
               <a:buNone/>
             </a:pPr>
             <a:r>
-              <a:rPr i="1">
-                <a:solidFill>
-                  <a:srgbClr val="60A0B0"/>
-                </a:solidFill>
-                <a:latin typeface="Courier"/>
-              </a:rPr>
-              <a:t># Original source is http://www.amstat.org/publications/jse/datasets/fev.dat.txt</a:t>
-            </a:r>
-            <a:br/>
-            <a:r>
               <a:rPr>
                 <a:latin typeface="Courier"/>
               </a:rPr>
@@ -20074,24 +20430,33 @@
             <a:r>
               <a:rPr>
                 <a:solidFill>
-                  <a:srgbClr val="06287E"/>
+                  <a:srgbClr val="7D9029"/>
                 </a:solidFill>
                 <a:latin typeface="Courier"/>
               </a:rPr>
-              <a:t>fwf_cols</a:t>
-            </a:r>
-            <a:r>
-              <a:rPr>
-                <a:latin typeface="Courier"/>
-              </a:rPr>
-              <a:t>(</a:t>
+              <a:t>col_types=</a:t>
+            </a:r>
+            <a:r>
+              <a:rPr>
+                <a:solidFill>
+                  <a:srgbClr val="4070A0"/>
+                </a:solidFill>
+                <a:latin typeface="Courier"/>
+              </a:rPr>
+              <a:t>"nnnnn"</a:t>
+            </a:r>
+            <a:r>
+              <a:rPr>
+                <a:latin typeface="Courier"/>
+              </a:rPr>
+              <a:t>,</a:t>
             </a:r>
             <a:br/>
             <a:r>
               <a:rPr>
                 <a:latin typeface="Courier"/>
               </a:rPr>
-              <a:t>    </a:t>
+              <a:t>  </a:t>
             </a:r>
             <a:r>
               <a:rPr>
@@ -20100,6 +20465,37 @@
                 </a:solidFill>
                 <a:latin typeface="Courier"/>
               </a:rPr>
+              <a:t>col_positions=</a:t>
+            </a:r>
+            <a:r>
+              <a:rPr>
+                <a:solidFill>
+                  <a:srgbClr val="06287E"/>
+                </a:solidFill>
+                <a:latin typeface="Courier"/>
+              </a:rPr>
+              <a:t>fwf_cols</a:t>
+            </a:r>
+            <a:r>
+              <a:rPr>
+                <a:latin typeface="Courier"/>
+              </a:rPr>
+              <a:t>(</a:t>
+            </a:r>
+            <a:br/>
+            <a:r>
+              <a:rPr>
+                <a:latin typeface="Courier"/>
+              </a:rPr>
+              <a:t>    </a:t>
+            </a:r>
+            <a:r>
+              <a:rPr>
+                <a:solidFill>
+                  <a:srgbClr val="7D9029"/>
+                </a:solidFill>
+                <a:latin typeface="Courier"/>
+              </a:rPr>
               <a:t>age=</a:t>
             </a:r>
             <a:r>
@@ -20109,7 +20505,7 @@
                 </a:solidFill>
                 <a:latin typeface="Courier"/>
               </a:rPr>
-              <a:t>2</a:t>
+              <a:t>3</a:t>
             </a:r>
             <a:r>
               <a:rPr>
@@ -20239,38 +20635,7 @@
               <a:rPr>
                 <a:latin typeface="Courier"/>
               </a:rPr>
-              <a:t>),</a:t>
-            </a:r>
-            <a:br/>
-            <a:r>
-              <a:rPr>
-                <a:latin typeface="Courier"/>
-              </a:rPr>
-              <a:t>  </a:t>
-            </a:r>
-            <a:r>
-              <a:rPr>
-                <a:solidFill>
-                  <a:srgbClr val="7D9029"/>
-                </a:solidFill>
-                <a:latin typeface="Courier"/>
-              </a:rPr>
-              <a:t>col_types=</a:t>
-            </a:r>
-            <a:r>
-              <a:rPr>
-                <a:solidFill>
-                  <a:srgbClr val="4070A0"/>
-                </a:solidFill>
-                <a:latin typeface="Courier"/>
-              </a:rPr>
-              <a:t>"nnnnn"</a:t>
-            </a:r>
-            <a:r>
-              <a:rPr>
-                <a:latin typeface="Courier"/>
-              </a:rPr>
-              <a:t>)</a:t>
+              <a:t>))</a:t>
             </a:r>
           </a:p>
         </p:txBody>
@@ -20406,16 +20771,16 @@
               <a:t>## # A tibble: 654 x 5
 ##      age   fev    ht   sex smoke
 ##    &lt;dbl&gt; &lt;dbl&gt; &lt;dbl&gt; &lt;dbl&gt; &lt;dbl&gt;
-##  1    NA     9     0     0     0
-##  2    NA     8     0     5     0
-##  3    NA     7     0     5     0
-##  4    NA     9     0     0     1
-##  5    NA     9     0     0     1
-##  6    NA     8     0     0     0
-##  7    NA     6     0     0     0
-##  8    NA     6     0     0     0
-##  9    NA     8     0     5     0
-## 10    NA     9     0     0     0
+##  1     9  1.71  57       0     0
+##  2     8  1.72  67.5     0     0
+##  3     7  1.72  54.5     0     0
+##  4     9  1.56  53       1     0
+##  5     9  1.90  57       1     0
+##  6     8  2.34  61       0     0
+##  7     6  1.92  58       0     0
+##  8     6  1.41  56       0     0
+##  9     8  1.99  58.5     0     0
+## 10     9  1.94  60       0     0
 ## # ... with 644 more rows</a:t>
             </a:r>
           </a:p>
@@ -20560,11 +20925,11 @@
               </a:rPr>
               <a:t>## Rows: 654
 ## Columns: 5
-## $ age   &lt;dbl&gt; NA, NA, NA, NA, NA, NA, NA~
-## $ fev   &lt;dbl&gt; 9, 8, 7, 9, 9, 8, 6, 6, 8,~
-## $ ht    &lt;dbl&gt; 0, 0, 0, 0, 0, 0, 0, 0, 0,~
-## $ sex   &lt;dbl&gt; 0, 5, 5, 0, 0, 0, 0, 0, 5,~
-## $ smoke &lt;dbl&gt; 0, 0, 0, 1, 1, 0, 0, 0, 0,~</a:t>
+## $ age   &lt;dbl&gt; 9, 8, 7, 9, 9, 8, 6, 6, ~
+## $ fev   &lt;dbl&gt; 1.708, 1.724, 1.720, 1.5~
+## $ ht    &lt;dbl&gt; 57.0, 67.5, 54.5, 53.0, ~
+## $ sex   &lt;dbl&gt; 0, 0, 0, 1, 1, 0, 0, 0, ~
+## $ smoke &lt;dbl&gt; 0, 0, 0, 0, 0, 0, 0, 0, ~</a:t>
             </a:r>
           </a:p>
         </p:txBody>

</xml_diff>

<commit_message>
Finalized module05 for r
</commit_message>
<xml_diff>
--- a/introduction-to-r/results/v05-slides-and-speaker-notes.pptx
+++ b/introduction-to-r/results/v05-slides-and-speaker-notes.pptx
@@ -17819,7 +17819,7 @@
               <a:rPr>
                 <a:latin typeface="Courier"/>
               </a:rPr>
-              <a:t>## [1] "R version 4.1.2 (2021-11-01)"</a:t>
+              <a:t>## [1] "R version 4.1.1 (2021-08-10)"</a:t>
             </a:r>
           </a:p>
           <a:p>
@@ -17850,7 +17850,7 @@
               <a:rPr>
                 <a:latin typeface="Courier"/>
               </a:rPr>
-              <a:t>## [1] "2022-04-30"</a:t>
+              <a:t>## [1] "2022-05-02"</a:t>
             </a:r>
           </a:p>
         </p:txBody>

</xml_diff>